<commit_message>
Some edits for session 3
</commit_message>
<xml_diff>
--- a/Code/Slides/Academy PGH 2.1 Ruby.pptx
+++ b/Code/Slides/Academy PGH 2.1 Ruby.pptx
@@ -390,7 +390,7 @@
           <a:p>
             <a:fld id="{A0D5A457-80BB-4542-9113-D0F48A70DEEA}" type="datetimeFigureOut">
               <a:rPr lang="en-US" smtClean="0"/>
-              <a:t>10/3/2016</a:t>
+              <a:t>3/5/2017</a:t>
             </a:fld>
             <a:endParaRPr lang="en-US"/>
           </a:p>
@@ -558,7 +558,7 @@
           <a:p>
             <a:fld id="{A0D5A457-80BB-4542-9113-D0F48A70DEEA}" type="datetimeFigureOut">
               <a:rPr lang="en-US" smtClean="0"/>
-              <a:t>10/3/2016</a:t>
+              <a:t>3/5/2017</a:t>
             </a:fld>
             <a:endParaRPr lang="en-US"/>
           </a:p>
@@ -736,7 +736,7 @@
           <a:p>
             <a:fld id="{A0D5A457-80BB-4542-9113-D0F48A70DEEA}" type="datetimeFigureOut">
               <a:rPr lang="en-US" smtClean="0"/>
-              <a:t>10/3/2016</a:t>
+              <a:t>3/5/2017</a:t>
             </a:fld>
             <a:endParaRPr lang="en-US"/>
           </a:p>
@@ -904,7 +904,7 @@
           <a:p>
             <a:fld id="{A0D5A457-80BB-4542-9113-D0F48A70DEEA}" type="datetimeFigureOut">
               <a:rPr lang="en-US" smtClean="0"/>
-              <a:t>10/3/2016</a:t>
+              <a:t>3/5/2017</a:t>
             </a:fld>
             <a:endParaRPr lang="en-US"/>
           </a:p>
@@ -1149,7 +1149,7 @@
           <a:p>
             <a:fld id="{A0D5A457-80BB-4542-9113-D0F48A70DEEA}" type="datetimeFigureOut">
               <a:rPr lang="en-US" smtClean="0"/>
-              <a:t>10/3/2016</a:t>
+              <a:t>3/5/2017</a:t>
             </a:fld>
             <a:endParaRPr lang="en-US"/>
           </a:p>
@@ -1378,7 +1378,7 @@
           <a:p>
             <a:fld id="{A0D5A457-80BB-4542-9113-D0F48A70DEEA}" type="datetimeFigureOut">
               <a:rPr lang="en-US" smtClean="0"/>
-              <a:t>10/3/2016</a:t>
+              <a:t>3/5/2017</a:t>
             </a:fld>
             <a:endParaRPr lang="en-US"/>
           </a:p>
@@ -1742,7 +1742,7 @@
           <a:p>
             <a:fld id="{A0D5A457-80BB-4542-9113-D0F48A70DEEA}" type="datetimeFigureOut">
               <a:rPr lang="en-US" smtClean="0"/>
-              <a:t>10/3/2016</a:t>
+              <a:t>3/5/2017</a:t>
             </a:fld>
             <a:endParaRPr lang="en-US"/>
           </a:p>
@@ -1859,7 +1859,7 @@
           <a:p>
             <a:fld id="{A0D5A457-80BB-4542-9113-D0F48A70DEEA}" type="datetimeFigureOut">
               <a:rPr lang="en-US" smtClean="0"/>
-              <a:t>10/3/2016</a:t>
+              <a:t>3/5/2017</a:t>
             </a:fld>
             <a:endParaRPr lang="en-US"/>
           </a:p>
@@ -1954,7 +1954,7 @@
           <a:p>
             <a:fld id="{A0D5A457-80BB-4542-9113-D0F48A70DEEA}" type="datetimeFigureOut">
               <a:rPr lang="en-US" smtClean="0"/>
-              <a:t>10/3/2016</a:t>
+              <a:t>3/5/2017</a:t>
             </a:fld>
             <a:endParaRPr lang="en-US"/>
           </a:p>
@@ -2229,7 +2229,7 @@
           <a:p>
             <a:fld id="{A0D5A457-80BB-4542-9113-D0F48A70DEEA}" type="datetimeFigureOut">
               <a:rPr lang="en-US" smtClean="0"/>
-              <a:t>10/3/2016</a:t>
+              <a:t>3/5/2017</a:t>
             </a:fld>
             <a:endParaRPr lang="en-US"/>
           </a:p>
@@ -2481,7 +2481,7 @@
           <a:p>
             <a:fld id="{A0D5A457-80BB-4542-9113-D0F48A70DEEA}" type="datetimeFigureOut">
               <a:rPr lang="en-US" smtClean="0"/>
-              <a:t>10/3/2016</a:t>
+              <a:t>3/5/2017</a:t>
             </a:fld>
             <a:endParaRPr lang="en-US"/>
           </a:p>
@@ -2692,7 +2692,7 @@
           <a:p>
             <a:fld id="{A0D5A457-80BB-4542-9113-D0F48A70DEEA}" type="datetimeFigureOut">
               <a:rPr lang="en-US" smtClean="0"/>
-              <a:t>10/3/2016</a:t>
+              <a:t>3/5/2017</a:t>
             </a:fld>
             <a:endParaRPr lang="en-US"/>
           </a:p>
@@ -4196,16 +4196,12 @@
               <a:buNone/>
             </a:pPr>
             <a:r>
-              <a:rPr lang="en-US" dirty="0" err="1" smtClean="0"/>
+              <a:rPr lang="en-US" dirty="0" err="1"/>
               <a:t>elsif</a:t>
             </a:r>
             <a:r>
-              <a:rPr lang="en-US" dirty="0" smtClean="0"/>
-              <a:t> </a:t>
-            </a:r>
-            <a:r>
-              <a:rPr lang="en-US" dirty="0"/>
-              <a:t>(first condition is false, this condition is true) #code</a:t>
+              <a:rPr lang="en-US" dirty="0"/>
+              <a:t> (first condition is false, this condition is true) #code</a:t>
             </a:r>
           </a:p>
           <a:p>
@@ -4213,16 +4209,12 @@
               <a:buNone/>
             </a:pPr>
             <a:r>
-              <a:rPr lang="en-US" dirty="0" err="1" smtClean="0"/>
+              <a:rPr lang="en-US" dirty="0" err="1"/>
               <a:t>elsif</a:t>
             </a:r>
             <a:r>
-              <a:rPr lang="en-US" dirty="0" smtClean="0"/>
-              <a:t> </a:t>
-            </a:r>
-            <a:r>
-              <a:rPr lang="en-US" dirty="0"/>
-              <a:t>(previous conditions are false, this condition is true) #code</a:t>
+              <a:rPr lang="en-US" dirty="0"/>
+              <a:t> (previous conditions are false, this condition is true) #code</a:t>
             </a:r>
           </a:p>
           <a:p>
@@ -5315,7 +5307,7 @@
             <a:pPr lvl="1"/>
             <a:r>
               <a:rPr lang="en-US" dirty="0"/>
-              <a:t>1..3 is a range that contains 1, 2, 3</a:t>
+              <a:t>1..3 is a range (which is just an array) that contains 1, 2, 3</a:t>
             </a:r>
           </a:p>
           <a:p>
@@ -5697,7 +5689,7 @@
             <a:pPr lvl="1"/>
             <a:r>
               <a:rPr lang="en-US" dirty="0"/>
-              <a:t>Win: Visual Studio Code, Notepad ++</a:t>
+              <a:t>Win: Visual Studio Code, Notepad ++, Atom</a:t>
             </a:r>
           </a:p>
           <a:p>
@@ -5820,7 +5812,7 @@
         <p:spPr/>
         <p:txBody>
           <a:bodyPr>
-            <a:normAutofit lnSpcReduction="10000"/>
+            <a:normAutofit fontScale="92500"/>
           </a:bodyPr>
           <a:lstStyle/>
           <a:p>
@@ -5840,6 +5832,13 @@
             <a:r>
               <a:rPr lang="en-US" dirty="0"/>
               <a:t>Next causes the current iteration of the loop to end and start the next iteration</a:t>
+            </a:r>
+          </a:p>
+          <a:p>
+            <a:pPr lvl="1"/>
+            <a:r>
+              <a:rPr lang="en-US" dirty="0"/>
+              <a:t>This is used more regularly in Ruby than in C# (which is why Jean used it)</a:t>
             </a:r>
           </a:p>
           <a:p>
@@ -6440,7 +6439,7 @@
           <a:p>
             <a:r>
               <a:rPr lang="en-US" dirty="0"/>
-              <a:t>Let’s go play with some blocks for a moment</a:t>
+              <a:t>Let’s go draw for a moment</a:t>
             </a:r>
           </a:p>
         </p:txBody>
@@ -6526,7 +6525,11 @@
           <a:p>
             <a:r>
               <a:rPr lang="en-US" strike="sngStrike" dirty="0"/>
-              <a:t>There are other objects that work enough like arrays as to be mostly interchangeable – we will cover these soon (remember this?)</a:t>
+              <a:t>There are other objects that work enough like arrays as to be mostly interchangeable – we will cover these soon </a:t>
+            </a:r>
+            <a:r>
+              <a:rPr lang="en-US" dirty="0"/>
+              <a:t>(remember this?)</a:t>
             </a:r>
           </a:p>
           <a:p>
@@ -6889,6 +6892,12 @@
               <a:t>[:name]</a:t>
             </a:r>
           </a:p>
+          <a:p>
+            <a:r>
+              <a:rPr lang="en-US" dirty="0"/>
+              <a:t>Symbols are much like creating a variable and having that variable hold a string of the variable name in it. It IS useful in Ruby</a:t>
+            </a:r>
+          </a:p>
         </p:txBody>
       </p:sp>
     </p:spTree>
@@ -7258,95 +7267,93 @@
           <a:lstStyle/>
           <a:p>
             <a:r>
-              <a:rPr lang="en-US" dirty="0" smtClean="0"/>
+              <a:rPr lang="en-US" dirty="0"/>
               <a:t>Where are my returns?</a:t>
             </a:r>
+          </a:p>
+        </p:txBody>
+      </p:sp>
+      <p:sp>
+        <p:nvSpPr>
+          <p:cNvPr id="3" name="Content Placeholder 2"/>
+          <p:cNvSpPr>
+            <a:spLocks noGrp="1"/>
+          </p:cNvSpPr>
+          <p:nvPr>
+            <p:ph idx="1"/>
+          </p:nvPr>
+        </p:nvSpPr>
+        <p:spPr/>
+        <p:txBody>
+          <a:bodyPr/>
+          <a:lstStyle/>
+          <a:p>
+            <a:r>
+              <a:rPr lang="en-US" dirty="0"/>
+              <a:t>Every line in Ruby returns a value</a:t>
+            </a:r>
+          </a:p>
+          <a:p>
+            <a:r>
+              <a:rPr lang="en-US" dirty="0"/>
+              <a:t>Every function in Ruby returns a value</a:t>
+            </a:r>
+          </a:p>
+          <a:p>
+            <a:r>
+              <a:rPr lang="en-US" dirty="0"/>
+              <a:t>If you don’t explicitly say “return” then your function will return the value of the last line run in the function</a:t>
+            </a:r>
+          </a:p>
+          <a:p>
+            <a:r>
+              <a:rPr lang="en-US" dirty="0"/>
+              <a:t>Example Return Values:</a:t>
+            </a:r>
+          </a:p>
+          <a:p>
+            <a:pPr lvl="1"/>
+            <a:r>
+              <a:rPr lang="en-US" dirty="0" err="1"/>
+              <a:t>some_var</a:t>
+            </a:r>
+            <a:r>
+              <a:rPr lang="en-US" dirty="0"/>
+              <a:t> = 2 + 3 # this line returns 5</a:t>
+            </a:r>
+          </a:p>
+          <a:p>
+            <a:pPr lvl="1"/>
+            <a:r>
+              <a:rPr lang="en-US" dirty="0" err="1"/>
+              <a:t>another_var</a:t>
+            </a:r>
+            <a:r>
+              <a:rPr lang="en-US" dirty="0"/>
+              <a:t> # this line returns the value of </a:t>
+            </a:r>
+            <a:r>
+              <a:rPr lang="en-US" dirty="0" err="1"/>
+              <a:t>another_var</a:t>
+            </a:r>
             <a:endParaRPr lang="en-US" dirty="0"/>
           </a:p>
-        </p:txBody>
-      </p:sp>
-      <p:sp>
-        <p:nvSpPr>
-          <p:cNvPr id="3" name="Content Placeholder 2"/>
-          <p:cNvSpPr>
-            <a:spLocks noGrp="1"/>
-          </p:cNvSpPr>
-          <p:nvPr>
-            <p:ph idx="1"/>
-          </p:nvPr>
-        </p:nvSpPr>
-        <p:spPr/>
-        <p:txBody>
-          <a:bodyPr/>
-          <a:lstStyle/>
-          <a:p>
-            <a:r>
-              <a:rPr lang="en-US" dirty="0" smtClean="0"/>
-              <a:t>Every line in Ruby returns a value</a:t>
-            </a:r>
-          </a:p>
-          <a:p>
-            <a:r>
-              <a:rPr lang="en-US" dirty="0" smtClean="0"/>
-              <a:t>Every function in Ruby returns a value</a:t>
-            </a:r>
-          </a:p>
-          <a:p>
-            <a:r>
-              <a:rPr lang="en-US" dirty="0" smtClean="0"/>
-              <a:t>If you don’t explicitly say “return” then your function will return the value of the last line run in the function</a:t>
-            </a:r>
-          </a:p>
-          <a:p>
-            <a:r>
-              <a:rPr lang="en-US" dirty="0" smtClean="0"/>
-              <a:t>Example Return Values:</a:t>
-            </a:r>
-          </a:p>
-          <a:p>
-            <a:pPr lvl="1"/>
-            <a:r>
-              <a:rPr lang="en-US" dirty="0" err="1" smtClean="0"/>
-              <a:t>some_var</a:t>
-            </a:r>
-            <a:r>
-              <a:rPr lang="en-US" dirty="0" smtClean="0"/>
-              <a:t> = 2 + 3 # this line returns 5</a:t>
-            </a:r>
-          </a:p>
-          <a:p>
-            <a:pPr lvl="1"/>
-            <a:r>
-              <a:rPr lang="en-US" dirty="0" err="1" smtClean="0"/>
-              <a:t>another_var</a:t>
-            </a:r>
-            <a:r>
-              <a:rPr lang="en-US" dirty="0" smtClean="0"/>
-              <a:t> # this line returns the value of </a:t>
-            </a:r>
-            <a:r>
-              <a:rPr lang="en-US" dirty="0" err="1" smtClean="0"/>
-              <a:t>another_var</a:t>
-            </a:r>
-            <a:endParaRPr lang="en-US" dirty="0" smtClean="0"/>
-          </a:p>
-          <a:p>
-            <a:pPr lvl="1"/>
-            <a:r>
-              <a:rPr lang="en-US" dirty="0" smtClean="0"/>
+          <a:p>
+            <a:pPr lvl="1"/>
+            <a:r>
+              <a:rPr lang="en-US" dirty="0"/>
               <a:t>puts “hello” # this line returns nil</a:t>
             </a:r>
           </a:p>
           <a:p>
             <a:r>
-              <a:rPr lang="en-US" dirty="0" err="1" smtClean="0"/>
+              <a:rPr lang="en-US" dirty="0" err="1"/>
               <a:t>irb</a:t>
             </a:r>
             <a:r>
-              <a:rPr lang="en-US" dirty="0" smtClean="0"/>
+              <a:rPr lang="en-US" dirty="0"/>
               <a:t> shows the return value of each statement (look for the =&gt;)</a:t>
             </a:r>
-            <a:endParaRPr lang="en-US" dirty="0"/>
           </a:p>
         </p:txBody>
       </p:sp>
@@ -7432,22 +7439,21 @@
           <a:p>
             <a:pPr lvl="2"/>
             <a:r>
-              <a:rPr lang="en-US" dirty="0" err="1" smtClean="0"/>
+              <a:rPr lang="en-US" dirty="0" err="1"/>
               <a:t>my_file</a:t>
             </a:r>
             <a:r>
-              <a:rPr lang="en-US" dirty="0" smtClean="0"/>
+              <a:rPr lang="en-US" dirty="0"/>
               <a:t> = </a:t>
             </a:r>
             <a:r>
-              <a:rPr lang="en-US" dirty="0" err="1" smtClean="0"/>
+              <a:rPr lang="en-US" dirty="0" err="1"/>
               <a:t>File.read</a:t>
             </a:r>
             <a:r>
-              <a:rPr lang="en-US" dirty="0" smtClean="0"/>
+              <a:rPr lang="en-US" dirty="0"/>
               <a:t>("C:/WriteText.txt“)</a:t>
             </a:r>
-            <a:endParaRPr lang="en-US" dirty="0"/>
           </a:p>
           <a:p>
             <a:pPr lvl="1"/>
@@ -7459,46 +7465,45 @@
           <a:p>
             <a:pPr lvl="2"/>
             <a:r>
-              <a:rPr lang="en-US" dirty="0" err="1" smtClean="0"/>
+              <a:rPr lang="en-US" dirty="0" err="1"/>
               <a:t>File.open</a:t>
             </a:r>
             <a:r>
-              <a:rPr lang="en-US" dirty="0" smtClean="0"/>
+              <a:rPr lang="en-US" dirty="0"/>
               <a:t>(“c:/WriteText.txt”, “r”) do |f|</a:t>
             </a:r>
           </a:p>
           <a:p>
             <a:pPr lvl="3"/>
             <a:r>
-              <a:rPr lang="en-US" dirty="0" err="1" smtClean="0"/>
+              <a:rPr lang="en-US" dirty="0" err="1"/>
               <a:t>f.each_line</a:t>
             </a:r>
             <a:r>
-              <a:rPr lang="en-US" dirty="0" smtClean="0"/>
+              <a:rPr lang="en-US" dirty="0"/>
               <a:t> do |line|</a:t>
             </a:r>
           </a:p>
           <a:p>
             <a:pPr lvl="4"/>
             <a:r>
-              <a:rPr lang="en-US" dirty="0" smtClean="0"/>
+              <a:rPr lang="en-US" dirty="0"/>
               <a:t>puts line</a:t>
             </a:r>
           </a:p>
           <a:p>
             <a:pPr lvl="3"/>
             <a:r>
-              <a:rPr lang="en-US" dirty="0" smtClean="0"/>
+              <a:rPr lang="en-US" dirty="0"/>
               <a:t>end</a:t>
             </a:r>
           </a:p>
           <a:p>
             <a:pPr lvl="2"/>
             <a:r>
-              <a:rPr lang="en-US" dirty="0" smtClean="0"/>
+              <a:rPr lang="en-US" dirty="0"/>
               <a:t>end</a:t>
             </a:r>
-            <a:endParaRPr lang="en-US" dirty="0"/>
           </a:p>
         </p:txBody>
       </p:sp>
@@ -7549,7 +7554,7 @@
           <a:p>
             <a:r>
               <a:rPr lang="en-US" dirty="0"/>
-              <a:t>String Formatting</a:t>
+              <a:t>String Formatting (Interpolation)</a:t>
             </a:r>
           </a:p>
         </p:txBody>
@@ -7583,58 +7588,33 @@
           <a:p>
             <a:pPr lvl="1"/>
             <a:r>
-              <a:rPr lang="en-US" dirty="0" smtClean="0"/>
-              <a:t>puts “The </a:t>
-            </a:r>
-            <a:r>
-              <a:rPr lang="en-US" dirty="0"/>
-              <a:t>length is “ + </a:t>
-            </a:r>
-            <a:r>
-              <a:rPr lang="en-US" dirty="0" err="1" smtClean="0"/>
+              <a:rPr lang="en-US" dirty="0"/>
+              <a:t>puts “The length is “ + </a:t>
+            </a:r>
+            <a:r>
+              <a:rPr lang="en-US" dirty="0" err="1"/>
               <a:t>length.to_s</a:t>
             </a:r>
             <a:r>
-              <a:rPr lang="en-US" dirty="0" smtClean="0"/>
-              <a:t> </a:t>
-            </a:r>
-            <a:r>
-              <a:rPr lang="en-US" dirty="0"/>
-              <a:t>+ “ and the width is “ + </a:t>
-            </a:r>
-            <a:r>
-              <a:rPr lang="en-US" dirty="0" err="1" smtClean="0"/>
+              <a:rPr lang="en-US" dirty="0"/>
+              <a:t> + “ and the width is “ + </a:t>
+            </a:r>
+            <a:r>
+              <a:rPr lang="en-US" dirty="0" err="1"/>
               <a:t>width.to_s</a:t>
             </a:r>
             <a:r>
-              <a:rPr lang="en-US" dirty="0" smtClean="0"/>
-              <a:t> </a:t>
-            </a:r>
-            <a:r>
-              <a:rPr lang="en-US" dirty="0"/>
-              <a:t>+ “ so the area is “ + </a:t>
-            </a:r>
-            <a:r>
-              <a:rPr lang="en-US" dirty="0" smtClean="0"/>
-              <a:t>(length </a:t>
-            </a:r>
-            <a:r>
-              <a:rPr lang="en-US" dirty="0"/>
-              <a:t>* </a:t>
-            </a:r>
-            <a:r>
-              <a:rPr lang="en-US" dirty="0" smtClean="0"/>
-              <a:t>width).</a:t>
-            </a:r>
-            <a:r>
-              <a:rPr lang="en-US" dirty="0" err="1" smtClean="0"/>
+              <a:rPr lang="en-US" dirty="0"/>
+              <a:t> + “ so the area is “ + (length * width).</a:t>
+            </a:r>
+            <a:r>
+              <a:rPr lang="en-US" dirty="0" err="1"/>
               <a:t>to_s</a:t>
             </a:r>
             <a:r>
-              <a:rPr lang="en-US" dirty="0" smtClean="0"/>
+              <a:rPr lang="en-US" dirty="0"/>
               <a:t> + “.”</a:t>
             </a:r>
-            <a:endParaRPr lang="en-US" dirty="0"/>
           </a:p>
           <a:p>
             <a:r>
@@ -7645,38 +7625,9 @@
           <a:p>
             <a:pPr lvl="1"/>
             <a:r>
-              <a:rPr lang="en-US" dirty="0" smtClean="0"/>
-              <a:t>“</a:t>
-            </a:r>
-            <a:r>
-              <a:rPr lang="en-US" dirty="0"/>
-              <a:t>The length is </a:t>
-            </a:r>
-            <a:r>
-              <a:rPr lang="en-US" dirty="0" smtClean="0"/>
-              <a:t>#{length} </a:t>
-            </a:r>
-            <a:r>
-              <a:rPr lang="en-US" dirty="0"/>
-              <a:t>and the width is </a:t>
-            </a:r>
-            <a:r>
-              <a:rPr lang="en-US" dirty="0" smtClean="0"/>
-              <a:t>#</a:t>
-            </a:r>
-            <a:r>
-              <a:rPr lang="en-US" dirty="0" smtClean="0"/>
-              <a:t>{width} </a:t>
-            </a:r>
-            <a:r>
-              <a:rPr lang="en-US" dirty="0"/>
-              <a:t>so the area is </a:t>
-            </a:r>
-            <a:r>
-              <a:rPr lang="en-US" dirty="0" smtClean="0"/>
-              <a:t>#{length * width}”</a:t>
-            </a:r>
-            <a:endParaRPr lang="en-US" dirty="0"/>
+              <a:rPr lang="en-US" dirty="0"/>
+              <a:t>“The length is #{length} and the width is #{width} so the area is #{length * width}”</a:t>
+            </a:r>
           </a:p>
           <a:p>
             <a:endParaRPr lang="en-US" dirty="0"/>
@@ -7879,56 +7830,32 @@
           <a:p>
             <a:r>
               <a:rPr lang="en-US" dirty="0"/>
-              <a:t>Variables (aka Members</a:t>
-            </a:r>
-            <a:r>
-              <a:rPr lang="en-US" dirty="0" smtClean="0"/>
-              <a:t>)</a:t>
-            </a:r>
-            <a:endParaRPr lang="en-US" dirty="0"/>
-          </a:p>
-          <a:p>
-            <a:r>
-              <a:rPr lang="en-US" dirty="0"/>
-              <a:t>Functions(aka Methods</a:t>
-            </a:r>
-            <a:r>
-              <a:rPr lang="en-US" dirty="0" smtClean="0"/>
-              <a:t>)</a:t>
-            </a:r>
-          </a:p>
-          <a:p>
-            <a:r>
-              <a:rPr lang="en-US" dirty="0" smtClean="0"/>
+              <a:t>Variables (aka Members)</a:t>
+            </a:r>
+          </a:p>
+          <a:p>
+            <a:r>
+              <a:rPr lang="en-US" dirty="0"/>
+              <a:t>Functions(aka Methods)</a:t>
+            </a:r>
+          </a:p>
+          <a:p>
+            <a:r>
+              <a:rPr lang="en-US" dirty="0"/>
               <a:t>Variables may have accessors on them (think public/private from C#)</a:t>
             </a:r>
-            <a:endParaRPr lang="en-US" dirty="0"/>
-          </a:p>
-          <a:p>
-            <a:r>
-              <a:rPr lang="en-US" dirty="0" smtClean="0"/>
-              <a:t>Methods </a:t>
-            </a:r>
-            <a:r>
-              <a:rPr lang="en-US" dirty="0"/>
-              <a:t>can be public or </a:t>
-            </a:r>
-            <a:r>
-              <a:rPr lang="en-US" dirty="0" smtClean="0"/>
-              <a:t>private</a:t>
-            </a:r>
-            <a:endParaRPr lang="en-US" dirty="0"/>
-          </a:p>
-          <a:p>
-            <a:r>
-              <a:rPr lang="en-US" dirty="0"/>
-              <a:t>Special Function – </a:t>
-            </a:r>
-            <a:r>
-              <a:rPr lang="en-US" dirty="0" smtClean="0"/>
-              <a:t>Initialize</a:t>
-            </a:r>
-            <a:endParaRPr lang="en-US" dirty="0"/>
+          </a:p>
+          <a:p>
+            <a:r>
+              <a:rPr lang="en-US" dirty="0"/>
+              <a:t>Methods can be public or private</a:t>
+            </a:r>
+          </a:p>
+          <a:p>
+            <a:r>
+              <a:rPr lang="en-US" dirty="0"/>
+              <a:t>Special Function – Initialize</a:t>
+            </a:r>
           </a:p>
           <a:p>
             <a:pPr lvl="1"/>
@@ -7944,15 +7871,15 @@
               <a:t>This is what is called when you say </a:t>
             </a:r>
             <a:r>
-              <a:rPr lang="en-US" dirty="0" err="1" smtClean="0"/>
+              <a:rPr lang="en-US" dirty="0" err="1"/>
               <a:t>my_var</a:t>
             </a:r>
             <a:r>
-              <a:rPr lang="en-US" dirty="0" smtClean="0"/>
+              <a:rPr lang="en-US" dirty="0"/>
               <a:t> = </a:t>
             </a:r>
             <a:r>
-              <a:rPr lang="en-US" dirty="0" err="1" smtClean="0"/>
+              <a:rPr lang="en-US" dirty="0" err="1"/>
               <a:t>My_class.new</a:t>
             </a:r>
             <a:endParaRPr lang="en-US" dirty="0"/>
@@ -8037,88 +7964,85 @@
           <a:p>
             <a:pPr lvl="1"/>
             <a:r>
-              <a:rPr lang="en-US" dirty="0" smtClean="0"/>
+              <a:rPr lang="en-US" dirty="0"/>
               <a:t>@</a:t>
             </a:r>
             <a:r>
-              <a:rPr lang="en-US" dirty="0" err="1" smtClean="0"/>
+              <a:rPr lang="en-US" dirty="0" err="1"/>
               <a:t>some_variable</a:t>
             </a:r>
-            <a:endParaRPr lang="en-US" dirty="0" smtClean="0"/>
-          </a:p>
-          <a:p>
-            <a:pPr lvl="1"/>
-            <a:r>
-              <a:rPr lang="en-US" dirty="0" err="1" smtClean="0"/>
+            <a:endParaRPr lang="en-US" dirty="0"/>
+          </a:p>
+          <a:p>
+            <a:pPr lvl="1"/>
+            <a:r>
+              <a:rPr lang="en-US" dirty="0" err="1"/>
               <a:t>attr_accessor</a:t>
             </a:r>
             <a:r>
-              <a:rPr lang="en-US" dirty="0" smtClean="0"/>
+              <a:rPr lang="en-US" dirty="0"/>
               <a:t> :</a:t>
             </a:r>
             <a:r>
-              <a:rPr lang="en-US" dirty="0" err="1" smtClean="0"/>
+              <a:rPr lang="en-US" dirty="0" err="1"/>
               <a:t>a_second_variable</a:t>
             </a:r>
-            <a:endParaRPr lang="en-US" dirty="0" smtClean="0"/>
-          </a:p>
-          <a:p>
-            <a:pPr lvl="1"/>
-            <a:r>
-              <a:rPr lang="en-US" dirty="0" err="1" smtClean="0"/>
+            <a:endParaRPr lang="en-US" dirty="0"/>
+          </a:p>
+          <a:p>
+            <a:pPr lvl="1"/>
+            <a:r>
+              <a:rPr lang="en-US" dirty="0" err="1"/>
               <a:t>def</a:t>
             </a:r>
             <a:r>
-              <a:rPr lang="en-US" dirty="0" smtClean="0"/>
+              <a:rPr lang="en-US" dirty="0"/>
               <a:t> </a:t>
             </a:r>
             <a:r>
-              <a:rPr lang="en-US" dirty="0" err="1" smtClean="0"/>
+              <a:rPr lang="en-US" dirty="0" err="1"/>
               <a:t>function_name</a:t>
             </a:r>
-            <a:endParaRPr lang="en-US" dirty="0" smtClean="0"/>
+            <a:endParaRPr lang="en-US" dirty="0"/>
           </a:p>
           <a:p>
             <a:pPr lvl="2"/>
             <a:r>
-              <a:rPr lang="en-US" dirty="0" smtClean="0"/>
+              <a:rPr lang="en-US" dirty="0"/>
               <a:t># This is a function</a:t>
             </a:r>
           </a:p>
           <a:p>
             <a:pPr lvl="1"/>
             <a:r>
-              <a:rPr lang="en-US" dirty="0" smtClean="0"/>
+              <a:rPr lang="en-US" dirty="0"/>
               <a:t>end</a:t>
             </a:r>
-            <a:endParaRPr lang="en-US" dirty="0"/>
-          </a:p>
-          <a:p>
-            <a:pPr lvl="1"/>
-            <a:r>
-              <a:rPr lang="en-US" dirty="0" err="1" smtClean="0"/>
+          </a:p>
+          <a:p>
+            <a:pPr lvl="1"/>
+            <a:r>
+              <a:rPr lang="en-US" dirty="0" err="1"/>
               <a:t>def</a:t>
             </a:r>
             <a:r>
-              <a:rPr lang="en-US" dirty="0" smtClean="0"/>
+              <a:rPr lang="en-US" dirty="0"/>
               <a:t> initialize</a:t>
             </a:r>
           </a:p>
           <a:p>
             <a:pPr lvl="2"/>
             <a:r>
-              <a:rPr lang="en-US" dirty="0" smtClean="0"/>
+              <a:rPr lang="en-US" dirty="0"/>
               <a:t># This is the constructor/initializer</a:t>
             </a:r>
-            <a:endParaRPr lang="en-US" dirty="0" smtClean="0"/>
-          </a:p>
-          <a:p>
-            <a:pPr lvl="1"/>
-            <a:r>
-              <a:rPr lang="en-US" dirty="0" smtClean="0"/>
+          </a:p>
+          <a:p>
+            <a:pPr lvl="1"/>
+            <a:r>
+              <a:rPr lang="en-US" dirty="0"/>
               <a:t>end</a:t>
             </a:r>
-            <a:endParaRPr lang="en-US" dirty="0"/>
           </a:p>
           <a:p>
             <a:r>
@@ -8197,56 +8121,51 @@
           <a:p>
             <a:r>
               <a:rPr lang="en-US" dirty="0"/>
-              <a:t>Classes must be </a:t>
-            </a:r>
-            <a:r>
-              <a:rPr lang="en-US" dirty="0" smtClean="0"/>
-              <a:t>instantiated, often by using .new</a:t>
+              <a:t>Classes must be instantiated, often by using .new</a:t>
+            </a:r>
+          </a:p>
+          <a:p>
+            <a:r>
+              <a:rPr lang="en-US" dirty="0"/>
+              <a:t>Looks just like any other variable:</a:t>
+            </a:r>
+          </a:p>
+          <a:p>
+            <a:pPr lvl="1"/>
+            <a:r>
+              <a:rPr lang="en-US" dirty="0" err="1"/>
+              <a:t>some_var</a:t>
+            </a:r>
+            <a:r>
+              <a:rPr lang="en-US" dirty="0"/>
+              <a:t> = </a:t>
+            </a:r>
+            <a:r>
+              <a:rPr lang="en-US" dirty="0" err="1"/>
+              <a:t>My_class.new</a:t>
             </a:r>
             <a:endParaRPr lang="en-US" dirty="0"/>
           </a:p>
           <a:p>
-            <a:r>
-              <a:rPr lang="en-US" dirty="0"/>
-              <a:t>Looks just like any other variable:</a:t>
-            </a:r>
-          </a:p>
-          <a:p>
-            <a:pPr lvl="1"/>
-            <a:r>
-              <a:rPr lang="en-US" dirty="0" err="1" smtClean="0"/>
-              <a:t>some_var</a:t>
-            </a:r>
-            <a:r>
-              <a:rPr lang="en-US" dirty="0" smtClean="0"/>
-              <a:t> = </a:t>
-            </a:r>
-            <a:r>
-              <a:rPr lang="en-US" dirty="0" err="1" smtClean="0"/>
-              <a:t>My_class.new</a:t>
-            </a:r>
-            <a:endParaRPr lang="en-US" dirty="0"/>
-          </a:p>
-          <a:p>
-            <a:pPr lvl="1"/>
-            <a:r>
-              <a:rPr lang="en-US" dirty="0" err="1" smtClean="0"/>
+            <a:pPr lvl="1"/>
+            <a:r>
+              <a:rPr lang="en-US" dirty="0" err="1"/>
               <a:t>some_var.do_something_useful</a:t>
             </a:r>
             <a:r>
-              <a:rPr lang="en-US" dirty="0" smtClean="0"/>
+              <a:rPr lang="en-US" dirty="0"/>
               <a:t> # this calls the function called </a:t>
             </a:r>
             <a:r>
-              <a:rPr lang="en-US" dirty="0" err="1" smtClean="0"/>
+              <a:rPr lang="en-US" dirty="0" err="1"/>
               <a:t>do_something_useful</a:t>
             </a:r>
             <a:r>
-              <a:rPr lang="en-US" dirty="0" smtClean="0"/>
+              <a:rPr lang="en-US" dirty="0"/>
               <a:t> you defined in </a:t>
             </a:r>
             <a:r>
-              <a:rPr lang="en-US" dirty="0" err="1" smtClean="0"/>
+              <a:rPr lang="en-US" dirty="0" err="1"/>
               <a:t>My_class</a:t>
             </a:r>
             <a:endParaRPr lang="en-US" dirty="0"/>

</xml_diff>